<commit_message>
updated bracket and powerpoint
Put a chamfer on the bracket and did more of the powerpoint
</commit_message>
<xml_diff>
--- a/MAVRIC Midterm Design Powerpoint/MAVRIC14 Jeffrey Kyle Chassis Midterm Design Review.pptx
+++ b/MAVRIC Midterm Design Powerpoint/MAVRIC14 Jeffrey Kyle Chassis Midterm Design Review.pptx
@@ -685,10 +685,6 @@
           <a:bodyPr/>
           <a:lstStyle/>
           <a:p>
-            <a:r>
-              <a:rPr lang="en-US" dirty="0" smtClean="0"/>
-              <a:t>http://www.erindustrial.com/images/zerimages/500/OSB-32125HR.jpg</a:t>
-            </a:r>
             <a:endParaRPr lang="en-US" dirty="0"/>
           </a:p>
         </p:txBody>
@@ -755,10 +751,6 @@
           <a:bodyPr/>
           <a:lstStyle/>
           <a:p>
-            <a:r>
-              <a:rPr lang="en-US" dirty="0" smtClean="0"/>
-              <a:t>http://www.erindustrial.com/images/zerimages/500/OSB-32125HR.jpg</a:t>
-            </a:r>
             <a:endParaRPr lang="en-US" dirty="0"/>
           </a:p>
         </p:txBody>
@@ -1640,7 +1632,7 @@
           </a:bodyPr>
           <a:lstStyle/>
           <a:p>
-            <a:pPr lvl="0" rtl="0">
+            <a:pPr lvl="0" algn="ctr" rtl="0">
               <a:lnSpc>
                 <a:spcPct val="100000"/>
               </a:lnSpc>
@@ -1761,9 +1753,16 @@
             </a:pPr>
             <a:r>
               <a:rPr lang="en-US" sz="2400" dirty="0" smtClean="0"/>
-              <a:t>Chassis Panel covers</a:t>
+              <a:t>Chassis </a:t>
             </a:r>
-            <a:endParaRPr lang="en-US" sz="2400" dirty="0" smtClean="0"/>
+            <a:r>
+              <a:rPr lang="en-US" sz="2400" dirty="0" smtClean="0"/>
+              <a:t>panel </a:t>
+            </a:r>
+            <a:r>
+              <a:rPr lang="en-US" sz="2400" dirty="0" smtClean="0"/>
+              <a:t>covers</a:t>
+            </a:r>
           </a:p>
           <a:p>
             <a:pPr marL="516467" marR="0" lvl="0" indent="-457200" rtl="0">
@@ -1848,7 +1847,50 @@
             </a:pPr>
             <a:r>
               <a:rPr lang="en-US" sz="2400" dirty="0" smtClean="0"/>
-              <a:t>Cross members</a:t>
+              <a:t>Frame Cross members</a:t>
+            </a:r>
+          </a:p>
+          <a:p>
+            <a:pPr marL="516467" marR="0" lvl="0" indent="-457200" rtl="0">
+              <a:lnSpc>
+                <a:spcPct val="100000"/>
+              </a:lnSpc>
+              <a:spcBef>
+                <a:spcPts val="0"/>
+              </a:spcBef>
+              <a:spcAft>
+                <a:spcPts val="0"/>
+              </a:spcAft>
+              <a:buClr>
+                <a:srgbClr val="000000"/>
+              </a:buClr>
+              <a:buSzPct val="164609"/>
+              <a:buFont typeface="Arial" pitchFamily="34" charset="0"/>
+              <a:buChar char="•"/>
+            </a:pPr>
+            <a:endParaRPr lang="en-US" sz="2400" dirty="0"/>
+          </a:p>
+          <a:p>
+            <a:pPr marL="516467" marR="0" lvl="0" indent="-457200" rtl="0">
+              <a:lnSpc>
+                <a:spcPct val="100000"/>
+              </a:lnSpc>
+              <a:spcBef>
+                <a:spcPts val="0"/>
+              </a:spcBef>
+              <a:spcAft>
+                <a:spcPts val="0"/>
+              </a:spcAft>
+              <a:buClr>
+                <a:srgbClr val="000000"/>
+              </a:buClr>
+              <a:buSzPct val="164609"/>
+              <a:buFont typeface="Arial" pitchFamily="34" charset="0"/>
+              <a:buChar char="•"/>
+            </a:pPr>
+            <a:r>
+              <a:rPr lang="en-US" sz="2400" dirty="0" smtClean="0"/>
+              <a:t>Camera Platform</a:t>
             </a:r>
             <a:endParaRPr lang="en-US" sz="2400" dirty="0" smtClean="0"/>
           </a:p>
@@ -1967,6 +2009,36 @@
           </a:p>
         </p:txBody>
       </p:sp>
+      <p:pic>
+        <p:nvPicPr>
+          <p:cNvPr id="3" name="Picture 2"/>
+          <p:cNvPicPr>
+            <a:picLocks noChangeAspect="1"/>
+          </p:cNvPicPr>
+          <p:nvPr/>
+        </p:nvPicPr>
+        <p:blipFill>
+          <a:blip r:embed="rId5">
+            <a:extLst>
+              <a:ext uri="{28A0092B-C50C-407E-A947-70E740481C1C}">
+                <a14:useLocalDpi xmlns:a14="http://schemas.microsoft.com/office/drawing/2010/main" val="0"/>
+              </a:ext>
+            </a:extLst>
+          </a:blip>
+          <a:stretch>
+            <a:fillRect/>
+          </a:stretch>
+        </p:blipFill>
+        <p:spPr>
+          <a:xfrm>
+            <a:off x="4699000" y="1724799"/>
+            <a:ext cx="5054600" cy="2992948"/>
+          </a:xfrm>
+          <a:prstGeom prst="rect">
+            <a:avLst/>
+          </a:prstGeom>
+        </p:spPr>
+      </p:pic>
     </p:spTree>
     <p:extLst>
       <p:ext uri="{BB962C8B-B14F-4D97-AF65-F5344CB8AC3E}">
@@ -2030,7 +2102,7 @@
             <a:pPr algn="ctr"/>
             <a:r>
               <a:rPr lang="en-US" dirty="0" smtClean="0"/>
-              <a:t>Design Idea #1</a:t>
+              <a:t>Differential Bar</a:t>
             </a:r>
             <a:endParaRPr lang="en-US" dirty="0"/>
           </a:p>
@@ -2071,7 +2143,7 @@
         </p:nvSpPr>
         <p:spPr>
           <a:xfrm>
-            <a:off x="4587872" y="1998125"/>
+            <a:off x="4600302" y="1337726"/>
             <a:ext cx="5501398" cy="5486399"/>
           </a:xfrm>
         </p:spPr>
@@ -2079,69 +2151,6 @@
           <a:bodyPr/>
           <a:lstStyle/>
           <a:p>
-            <a:r>
-              <a:rPr lang="en-US" sz="2400" dirty="0" smtClean="0"/>
-              <a:t>Pros</a:t>
-            </a:r>
-          </a:p>
-          <a:p>
-            <a:pPr marL="457200" indent="-457200">
-              <a:buFont typeface="Arial" pitchFamily="34" charset="0"/>
-              <a:buChar char="•"/>
-            </a:pPr>
-            <a:r>
-              <a:rPr lang="en-US" sz="2400" dirty="0" smtClean="0"/>
-              <a:t>Rotary brush, its super effective.</a:t>
-            </a:r>
-          </a:p>
-          <a:p>
-            <a:pPr marL="457200" indent="-457200">
-              <a:buFont typeface="Arial" pitchFamily="34" charset="0"/>
-              <a:buChar char="•"/>
-            </a:pPr>
-            <a:r>
-              <a:rPr lang="en-US" sz="2400" dirty="0" smtClean="0"/>
-              <a:t>Efficient.</a:t>
-            </a:r>
-          </a:p>
-          <a:p>
-            <a:pPr marL="457200" indent="-457200">
-              <a:buFont typeface="Arial" pitchFamily="34" charset="0"/>
-              <a:buChar char="•"/>
-            </a:pPr>
-            <a:r>
-              <a:rPr lang="en-US" sz="2400" dirty="0" smtClean="0"/>
-              <a:t>Fast.</a:t>
-            </a:r>
-          </a:p>
-          <a:p>
-            <a:endParaRPr lang="en-US" sz="2400" dirty="0"/>
-          </a:p>
-          <a:p>
-            <a:r>
-              <a:rPr lang="en-US" sz="2400" dirty="0" smtClean="0"/>
-              <a:t>Cons</a:t>
-            </a:r>
-          </a:p>
-          <a:p>
-            <a:pPr marL="457200" indent="-457200">
-              <a:buFont typeface="Arial" pitchFamily="34" charset="0"/>
-              <a:buChar char="•"/>
-            </a:pPr>
-            <a:r>
-              <a:rPr lang="en-US" sz="2400" dirty="0" smtClean="0"/>
-              <a:t>Complex.</a:t>
-            </a:r>
-          </a:p>
-          <a:p>
-            <a:pPr marL="457200" indent="-457200">
-              <a:buFont typeface="Arial" pitchFamily="34" charset="0"/>
-              <a:buChar char="•"/>
-            </a:pPr>
-            <a:r>
-              <a:rPr lang="en-US" sz="2400" dirty="0" smtClean="0"/>
-              <a:t>More possible failure points.</a:t>
-            </a:r>
             <a:endParaRPr lang="en-US" sz="2400" dirty="0"/>
           </a:p>
         </p:txBody>
@@ -2168,36 +2177,6 @@
           </a:blipFill>
         </p:spPr>
       </p:sp>
-      <p:pic>
-        <p:nvPicPr>
-          <p:cNvPr id="6" name="Picture 5"/>
-          <p:cNvPicPr>
-            <a:picLocks noChangeAspect="1"/>
-          </p:cNvPicPr>
-          <p:nvPr/>
-        </p:nvPicPr>
-        <p:blipFill>
-          <a:blip r:embed="rId4">
-            <a:extLst>
-              <a:ext uri="{28A0092B-C50C-407E-A947-70E740481C1C}">
-                <a14:useLocalDpi xmlns:a14="http://schemas.microsoft.com/office/drawing/2010/main" val="0"/>
-              </a:ext>
-            </a:extLst>
-          </a:blip>
-          <a:stretch>
-            <a:fillRect/>
-          </a:stretch>
-        </p:blipFill>
-        <p:spPr>
-          <a:xfrm>
-            <a:off x="816583" y="2494514"/>
-            <a:ext cx="3601548" cy="2642636"/>
-          </a:xfrm>
-          <a:prstGeom prst="rect">
-            <a:avLst/>
-          </a:prstGeom>
-        </p:spPr>
-      </p:pic>
       <p:sp>
         <p:nvSpPr>
           <p:cNvPr id="8" name="Shape 152"/>
@@ -2307,11 +2286,128 @@
             </a:lvl9pPr>
           </a:lstStyle>
           <a:p>
+            <a:pPr algn="ctr"/>
             <a:r>
-              <a:rPr lang="en-US" sz="5330" b="1" smtClean="0"/>
-              <a:t>Solar Panel Cleaning Tool</a:t>
+              <a:rPr lang="en-US" sz="5330" b="1" dirty="0" smtClean="0"/>
+              <a:t>Chassis Upgrades</a:t>
             </a:r>
             <a:endParaRPr lang="en-US" sz="5330" b="1" dirty="0"/>
+          </a:p>
+        </p:txBody>
+      </p:sp>
+      <p:sp>
+        <p:nvSpPr>
+          <p:cNvPr id="9" name="Title 1"/>
+          <p:cNvSpPr txBox="1">
+            <a:spLocks/>
+          </p:cNvSpPr>
+          <p:nvPr/>
+        </p:nvSpPr>
+        <p:spPr>
+          <a:xfrm>
+            <a:off x="-695155" y="3505200"/>
+            <a:ext cx="5486400" cy="914400"/>
+          </a:xfrm>
+          <a:prstGeom prst="rect">
+            <a:avLst/>
+          </a:prstGeom>
+        </p:spPr>
+        <p:txBody>
+          <a:bodyPr lIns="91425" tIns="91425" rIns="91425" bIns="91425" anchor="t" anchorCtr="0"/>
+          <a:lstStyle>
+            <a:defPPr marR="0" algn="l" rtl="0">
+              <a:lnSpc>
+                <a:spcPct val="100000"/>
+              </a:lnSpc>
+              <a:spcBef>
+                <a:spcPts val="0"/>
+              </a:spcBef>
+              <a:spcAft>
+                <a:spcPts val="0"/>
+              </a:spcAft>
+            </a:defPPr>
+            <a:lvl1pPr marR="0" algn="l" rtl="0">
+              <a:lnSpc>
+                <a:spcPct val="100000"/>
+              </a:lnSpc>
+              <a:spcBef>
+                <a:spcPts val="0"/>
+              </a:spcBef>
+              <a:spcAft>
+                <a:spcPts val="0"/>
+              </a:spcAft>
+              <a:buSzPct val="99224"/>
+              <a:buNone/>
+              <a:defRPr sz="4266" b="0" i="0" u="none" strike="noStrike" cap="none" baseline="0">
+                <a:solidFill>
+                  <a:srgbClr val="000000"/>
+                </a:solidFill>
+                <a:latin typeface="Arial"/>
+                <a:ea typeface="Arial"/>
+                <a:cs typeface="Arial"/>
+                <a:sym typeface="Arial"/>
+                <a:rtl val="0"/>
+              </a:defRPr>
+            </a:lvl1pPr>
+            <a:lvl2pPr marR="0" algn="l" rtl="0">
+              <a:lnSpc>
+                <a:spcPct val="100000"/>
+              </a:lnSpc>
+              <a:spcBef>
+                <a:spcPts val="0"/>
+              </a:spcBef>
+              <a:spcAft>
+                <a:spcPts val="0"/>
+              </a:spcAft>
+              <a:buSzPct val="99224"/>
+              <a:buNone/>
+              <a:defRPr sz="4266" b="0" i="0" u="none" strike="noStrike" cap="none" baseline="0">
+                <a:solidFill>
+                  <a:srgbClr val="000000"/>
+                </a:solidFill>
+                <a:latin typeface="Arial"/>
+                <a:ea typeface="Arial"/>
+                <a:cs typeface="Arial"/>
+                <a:sym typeface="Arial"/>
+                <a:rtl val="0"/>
+              </a:defRPr>
+            </a:lvl2pPr>
+            <a:lvl3pPr>
+              <a:buSzPct val="99224"/>
+              <a:defRPr sz="4266"/>
+            </a:lvl3pPr>
+            <a:lvl4pPr>
+              <a:buSzPct val="99224"/>
+              <a:defRPr sz="4266"/>
+            </a:lvl4pPr>
+            <a:lvl5pPr>
+              <a:buSzPct val="99224"/>
+              <a:defRPr sz="4266"/>
+            </a:lvl5pPr>
+            <a:lvl6pPr>
+              <a:buSzPct val="99224"/>
+              <a:defRPr sz="4266"/>
+            </a:lvl6pPr>
+            <a:lvl7pPr>
+              <a:buSzPct val="99224"/>
+              <a:defRPr sz="4266"/>
+            </a:lvl7pPr>
+            <a:lvl8pPr>
+              <a:buSzPct val="99224"/>
+              <a:defRPr sz="4266"/>
+            </a:lvl8pPr>
+            <a:lvl9pPr>
+              <a:buSzPct val="99224"/>
+              <a:defRPr sz="4266"/>
+            </a:lvl9pPr>
+          </a:lstStyle>
+          <a:p>
+            <a:pPr algn="ctr"/>
+            <a:r>
+              <a:rPr lang="en-US" dirty="0" smtClean="0"/>
+              <a:t>Battery Clips</a:t>
+            </a:r>
+            <a:endParaRPr lang="en-US" dirty="0"/>
           </a:p>
         </p:txBody>
       </p:sp>
@@ -2368,7 +2464,7 @@
             <a:pPr algn="ctr"/>
             <a:r>
               <a:rPr lang="en-US" dirty="0" smtClean="0"/>
-              <a:t>Design Idea #2</a:t>
+              <a:t>Panel Covers</a:t>
             </a:r>
             <a:endParaRPr lang="en-US" dirty="0"/>
           </a:p>
@@ -2409,8 +2505,8 @@
         </p:nvSpPr>
         <p:spPr>
           <a:xfrm>
-            <a:off x="4658601" y="1744126"/>
-            <a:ext cx="5501398" cy="5486399"/>
+            <a:off x="3937000" y="1744126"/>
+            <a:ext cx="6222999" cy="5486399"/>
           </a:xfrm>
         </p:spPr>
         <p:txBody>
@@ -2419,62 +2515,59 @@
           <a:p>
             <a:r>
               <a:rPr lang="en-US" dirty="0" smtClean="0"/>
-              <a:t>Pros</a:t>
+              <a:t>Design Considerations</a:t>
             </a:r>
           </a:p>
           <a:p>
-            <a:pPr marL="457200" indent="-457200">
-              <a:buFont typeface="Arial" pitchFamily="34" charset="0"/>
+            <a:endParaRPr lang="en-US" dirty="0" smtClean="0"/>
+          </a:p>
+          <a:p>
+            <a:pPr marL="457200" lvl="2" indent="-457200">
+              <a:buFont typeface="Arial" panose="020B0604020202020204" pitchFamily="34" charset="0"/>
               <a:buChar char="•"/>
             </a:pPr>
             <a:r>
               <a:rPr lang="en-US" dirty="0" smtClean="0"/>
-              <a:t>Simple.</a:t>
+              <a:t>Bottom must solid to hold electronics</a:t>
             </a:r>
           </a:p>
           <a:p>
-            <a:pPr marL="457200" indent="-457200">
-              <a:buFont typeface="Arial" pitchFamily="34" charset="0"/>
+            <a:pPr lvl="2"/>
+            <a:endParaRPr lang="en-US" dirty="0" smtClean="0"/>
+          </a:p>
+          <a:p>
+            <a:pPr marL="457200" lvl="2" indent="-457200">
+              <a:buFont typeface="Arial" panose="020B0604020202020204" pitchFamily="34" charset="0"/>
               <a:buChar char="•"/>
             </a:pPr>
             <a:r>
               <a:rPr lang="en-US" dirty="0" smtClean="0"/>
-              <a:t>Fewer points of failure.</a:t>
+              <a:t>Must fit under arm assembly</a:t>
             </a:r>
           </a:p>
           <a:p>
+            <a:pPr lvl="2"/>
             <a:endParaRPr lang="en-US" dirty="0" smtClean="0"/>
           </a:p>
           <a:p>
-            <a:endParaRPr lang="en-US" dirty="0"/>
-          </a:p>
-          <a:p>
-            <a:r>
-              <a:rPr lang="en-US" dirty="0" smtClean="0"/>
-              <a:t>Cons</a:t>
-            </a:r>
-          </a:p>
-          <a:p>
-            <a:pPr marL="457200" indent="-457200">
-              <a:buFont typeface="Arial" pitchFamily="34" charset="0"/>
+            <a:pPr marL="457200" lvl="2" indent="-457200">
+              <a:buFont typeface="Arial" panose="020B0604020202020204" pitchFamily="34" charset="0"/>
               <a:buChar char="•"/>
             </a:pPr>
             <a:r>
               <a:rPr lang="en-US" dirty="0" smtClean="0"/>
-              <a:t>Lower efficiency.</a:t>
+              <a:t>Easily removable</a:t>
             </a:r>
           </a:p>
           <a:p>
-            <a:pPr marL="457200" indent="-457200">
-              <a:buFont typeface="Arial" pitchFamily="34" charset="0"/>
+            <a:pPr lvl="2"/>
+            <a:endParaRPr lang="en-US" dirty="0" smtClean="0"/>
+          </a:p>
+          <a:p>
+            <a:pPr marL="457200" lvl="2" indent="-457200">
+              <a:buFont typeface="Arial" panose="020B0604020202020204" pitchFamily="34" charset="0"/>
               <a:buChar char="•"/>
             </a:pPr>
-            <a:r>
-              <a:rPr lang="en-US" dirty="0" smtClean="0"/>
-              <a:t>Not as effective.</a:t>
-            </a:r>
-          </a:p>
-          <a:p>
             <a:endParaRPr lang="en-US" dirty="0" smtClean="0"/>
           </a:p>
         </p:txBody>
@@ -2501,36 +2594,6 @@
           </a:blipFill>
         </p:spPr>
       </p:sp>
-      <p:pic>
-        <p:nvPicPr>
-          <p:cNvPr id="7" name="Picture 6"/>
-          <p:cNvPicPr>
-            <a:picLocks noChangeAspect="1"/>
-          </p:cNvPicPr>
-          <p:nvPr/>
-        </p:nvPicPr>
-        <p:blipFill>
-          <a:blip r:embed="rId4">
-            <a:extLst>
-              <a:ext uri="{28A0092B-C50C-407E-A947-70E740481C1C}">
-                <a14:useLocalDpi xmlns:a14="http://schemas.microsoft.com/office/drawing/2010/main" val="0"/>
-              </a:ext>
-            </a:extLst>
-          </a:blip>
-          <a:stretch>
-            <a:fillRect/>
-          </a:stretch>
-        </p:blipFill>
-        <p:spPr>
-          <a:xfrm>
-            <a:off x="660400" y="2971800"/>
-            <a:ext cx="2164735" cy="2164735"/>
-          </a:xfrm>
-          <a:prstGeom prst="rect">
-            <a:avLst/>
-          </a:prstGeom>
-        </p:spPr>
-      </p:pic>
       <p:sp>
         <p:nvSpPr>
           <p:cNvPr id="8" name="Shape 152"/>
@@ -2541,7 +2604,7 @@
         </p:nvSpPr>
         <p:spPr>
           <a:xfrm>
-            <a:off x="304800" y="304800"/>
+            <a:off x="325120" y="300565"/>
             <a:ext cx="9626699" cy="990599"/>
           </a:xfrm>
           <a:prstGeom prst="rect">
@@ -2640,9 +2703,10 @@
             </a:lvl9pPr>
           </a:lstStyle>
           <a:p>
+            <a:pPr algn="ctr"/>
             <a:r>
-              <a:rPr lang="en-US" sz="5330" b="1" smtClean="0"/>
-              <a:t>Solar Panel Cleaning Tool</a:t>
+              <a:rPr lang="en-US" sz="5330" b="1" dirty="0" smtClean="0"/>
+              <a:t>Chassis Upgrades</a:t>
             </a:r>
             <a:endParaRPr lang="en-US" sz="5330" b="1" dirty="0"/>
           </a:p>
@@ -2699,10 +2763,6 @@
           <a:lstStyle/>
           <a:p>
             <a:pPr algn="ctr"/>
-            <a:r>
-              <a:rPr lang="en-US" dirty="0" smtClean="0"/>
-              <a:t>Design Idea #3</a:t>
-            </a:r>
             <a:endParaRPr lang="en-US" dirty="0"/>
           </a:p>
         </p:txBody>
@@ -2749,82 +2809,6 @@
         <p:txBody>
           <a:bodyPr/>
           <a:lstStyle/>
-          <a:p>
-            <a:r>
-              <a:rPr lang="en-US" dirty="0" smtClean="0"/>
-              <a:t>Pros</a:t>
-            </a:r>
-          </a:p>
-          <a:p>
-            <a:pPr marL="457200" indent="-457200">
-              <a:buFont typeface="Arial" pitchFamily="34" charset="0"/>
-              <a:buChar char="•"/>
-            </a:pPr>
-            <a:r>
-              <a:rPr lang="en-US" dirty="0" smtClean="0"/>
-              <a:t>Simple.</a:t>
-            </a:r>
-          </a:p>
-          <a:p>
-            <a:pPr marL="457200" indent="-457200">
-              <a:buFont typeface="Arial" pitchFamily="34" charset="0"/>
-              <a:buChar char="•"/>
-            </a:pPr>
-            <a:r>
-              <a:rPr lang="en-US" dirty="0" smtClean="0"/>
-              <a:t>Moderate points of failure.</a:t>
-            </a:r>
-          </a:p>
-          <a:p>
-            <a:pPr marL="457200" indent="-457200">
-              <a:buFont typeface="Arial" pitchFamily="34" charset="0"/>
-              <a:buChar char="•"/>
-            </a:pPr>
-            <a:r>
-              <a:rPr lang="en-US" dirty="0" smtClean="0"/>
-              <a:t>Previous semester design, Few changes needed.</a:t>
-            </a:r>
-          </a:p>
-          <a:p>
-            <a:pPr marL="457200" indent="-457200">
-              <a:buFont typeface="Arial" pitchFamily="34" charset="0"/>
-              <a:buChar char="•"/>
-            </a:pPr>
-            <a:r>
-              <a:rPr lang="en-US" dirty="0" smtClean="0"/>
-              <a:t>Cheap.</a:t>
-            </a:r>
-            <a:endParaRPr lang="en-US" dirty="0"/>
-          </a:p>
-          <a:p>
-            <a:endParaRPr lang="en-US" dirty="0" smtClean="0"/>
-          </a:p>
-          <a:p>
-            <a:r>
-              <a:rPr lang="en-US" dirty="0" smtClean="0"/>
-              <a:t>Cons</a:t>
-            </a:r>
-          </a:p>
-          <a:p>
-            <a:pPr marL="457200" indent="-457200">
-              <a:buFont typeface="Arial" pitchFamily="34" charset="0"/>
-              <a:buChar char="•"/>
-            </a:pPr>
-            <a:r>
-              <a:rPr lang="en-US" dirty="0" smtClean="0"/>
-              <a:t>Low efficiency.</a:t>
-            </a:r>
-          </a:p>
-          <a:p>
-            <a:pPr marL="457200" indent="-457200">
-              <a:buFont typeface="Arial" pitchFamily="34" charset="0"/>
-              <a:buChar char="•"/>
-            </a:pPr>
-            <a:r>
-              <a:rPr lang="en-US" dirty="0" smtClean="0"/>
-              <a:t>Not as effective.</a:t>
-            </a:r>
-          </a:p>
           <a:p>
             <a:endParaRPr lang="en-US" dirty="0" smtClean="0"/>
           </a:p>
@@ -2988,9 +2972,10 @@
             </a:lvl9pPr>
           </a:lstStyle>
           <a:p>
+            <a:pPr algn="ctr"/>
             <a:r>
-              <a:rPr lang="en-US" sz="5330" b="1" smtClean="0"/>
-              <a:t>Solar Panel Cleaning Tool</a:t>
+              <a:rPr lang="en-US" sz="5330" b="1" dirty="0" smtClean="0"/>
+              <a:t>Chassis Upgrade</a:t>
             </a:r>
             <a:endParaRPr lang="en-US" sz="5330" b="1" dirty="0"/>
           </a:p>

</xml_diff>

<commit_message>
Chassis assembly render and Powerpoint
</commit_message>
<xml_diff>
--- a/MAVRIC Midterm Design Powerpoint/MAVRIC14 Jeffrey Kyle Chassis Midterm Design Review.pptx
+++ b/MAVRIC Midterm Design Powerpoint/MAVRIC14 Jeffrey Kyle Chassis Midterm Design Review.pptx
@@ -10,8 +10,8 @@
   <p:sldIdLst>
     <p:sldId id="293" r:id="rId2"/>
     <p:sldId id="294" r:id="rId3"/>
-    <p:sldId id="295" r:id="rId4"/>
-    <p:sldId id="296" r:id="rId5"/>
+    <p:sldId id="296" r:id="rId4"/>
+    <p:sldId id="295" r:id="rId5"/>
   </p:sldIdLst>
   <p:sldSz cx="10160000" cy="7620000"/>
   <p:notesSz cx="7620000" cy="10160000"/>
@@ -692,7 +692,7 @@
     </p:spTree>
     <p:extLst>
       <p:ext uri="{BB962C8B-B14F-4D97-AF65-F5344CB8AC3E}">
-        <p14:creationId xmlns:p14="http://schemas.microsoft.com/office/powerpoint/2010/main" val="1393573626"/>
+        <p14:creationId xmlns:p14="http://schemas.microsoft.com/office/powerpoint/2010/main" val="2809166064"/>
       </p:ext>
     </p:extLst>
   </p:cSld>
@@ -758,7 +758,7 @@
     </p:spTree>
     <p:extLst>
       <p:ext uri="{BB962C8B-B14F-4D97-AF65-F5344CB8AC3E}">
-        <p14:creationId xmlns:p14="http://schemas.microsoft.com/office/powerpoint/2010/main" val="2809166064"/>
+        <p14:creationId xmlns:p14="http://schemas.microsoft.com/office/powerpoint/2010/main" val="1393573626"/>
       </p:ext>
     </p:extLst>
   </p:cSld>
@@ -1753,15 +1753,7 @@
             </a:pPr>
             <a:r>
               <a:rPr lang="en-US" sz="2400" dirty="0" smtClean="0"/>
-              <a:t>Chassis </a:t>
-            </a:r>
-            <a:r>
-              <a:rPr lang="en-US" sz="2400" dirty="0" smtClean="0"/>
-              <a:t>panel </a:t>
-            </a:r>
-            <a:r>
-              <a:rPr lang="en-US" sz="2400" dirty="0" smtClean="0"/>
-              <a:t>covers</a:t>
+              <a:t>Chassis panel covers</a:t>
             </a:r>
           </a:p>
           <a:p>
@@ -1892,7 +1884,6 @@
               <a:rPr lang="en-US" sz="2400" dirty="0" smtClean="0"/>
               <a:t>Camera Platform</a:t>
             </a:r>
-            <a:endParaRPr lang="en-US" sz="2400" dirty="0" smtClean="0"/>
           </a:p>
           <a:p>
             <a:pPr marL="516467" marR="0" lvl="0" indent="-457200" rtl="0">
@@ -2011,13 +2002,13 @@
       </p:sp>
       <p:pic>
         <p:nvPicPr>
-          <p:cNvPr id="3" name="Picture 2"/>
+          <p:cNvPr id="4" name="Picture 3"/>
           <p:cNvPicPr>
             <a:picLocks noChangeAspect="1"/>
           </p:cNvPicPr>
           <p:nvPr/>
         </p:nvPicPr>
-        <p:blipFill>
+        <p:blipFill rotWithShape="1">
           <a:blip r:embed="rId5">
             <a:extLst>
               <a:ext uri="{28A0092B-C50C-407E-A947-70E740481C1C}">
@@ -2025,14 +2016,13 @@
               </a:ext>
             </a:extLst>
           </a:blip>
-          <a:stretch>
-            <a:fillRect/>
-          </a:stretch>
+          <a:srcRect l="20201" t="841" r="10859"/>
+          <a:stretch/>
         </p:blipFill>
         <p:spPr>
           <a:xfrm>
-            <a:off x="4699000" y="1724799"/>
-            <a:ext cx="5054600" cy="2992948"/>
+            <a:off x="4140200" y="2345670"/>
+            <a:ext cx="5105400" cy="3360458"/>
           </a:xfrm>
           <a:prstGeom prst="rect">
             <a:avLst/>
@@ -2118,7 +2108,12 @@
             <p:ph type="body" idx="1"/>
           </p:nvPr>
         </p:nvSpPr>
-        <p:spPr/>
+        <p:spPr>
+          <a:xfrm>
+            <a:off x="48884" y="4080925"/>
+            <a:ext cx="4343399" cy="770475"/>
+          </a:xfrm>
+        </p:spPr>
         <p:txBody>
           <a:bodyPr/>
           <a:lstStyle/>
@@ -2143,14 +2138,164 @@
         </p:nvSpPr>
         <p:spPr>
           <a:xfrm>
-            <a:off x="4600302" y="1337726"/>
-            <a:ext cx="5501398" cy="5486399"/>
+            <a:off x="4241800" y="1337726"/>
+            <a:ext cx="5859900" cy="5486399"/>
           </a:xfrm>
         </p:spPr>
         <p:txBody>
           <a:bodyPr/>
           <a:lstStyle/>
           <a:p>
+            <a:pPr marL="342900" indent="-342900">
+              <a:buFont typeface="Arial" panose="020B0604020202020204" pitchFamily="34" charset="0"/>
+              <a:buChar char="•"/>
+            </a:pPr>
+            <a:endParaRPr lang="en-US" sz="2400" dirty="0" smtClean="0"/>
+          </a:p>
+          <a:p>
+            <a:pPr marL="342900" indent="-342900">
+              <a:buFont typeface="Arial" panose="020B0604020202020204" pitchFamily="34" charset="0"/>
+              <a:buChar char="•"/>
+            </a:pPr>
+            <a:r>
+              <a:rPr lang="en-US" sz="2400" dirty="0" err="1" smtClean="0"/>
+              <a:t>Toolpaths</a:t>
+            </a:r>
+            <a:r>
+              <a:rPr lang="en-US" sz="2400" dirty="0" smtClean="0"/>
+              <a:t> created in </a:t>
+            </a:r>
+            <a:r>
+              <a:rPr lang="en-US" sz="2400" dirty="0" err="1" smtClean="0"/>
+              <a:t>Mastercam</a:t>
+            </a:r>
+            <a:endParaRPr lang="en-US" sz="2400" dirty="0" smtClean="0"/>
+          </a:p>
+          <a:p>
+            <a:pPr marL="342900" indent="-342900">
+              <a:buFont typeface="Arial" panose="020B0604020202020204" pitchFamily="34" charset="0"/>
+              <a:buChar char="•"/>
+            </a:pPr>
+            <a:r>
+              <a:rPr lang="en-US" sz="2400" dirty="0" smtClean="0"/>
+              <a:t>Stock was squared</a:t>
+            </a:r>
+            <a:br>
+              <a:rPr lang="en-US" sz="2400" dirty="0" smtClean="0"/>
+            </a:br>
+            <a:endParaRPr lang="en-US" sz="2400" dirty="0" smtClean="0"/>
+          </a:p>
+          <a:p>
+            <a:pPr marL="342900" indent="-342900">
+              <a:buFont typeface="Arial" panose="020B0604020202020204" pitchFamily="34" charset="0"/>
+              <a:buChar char="•"/>
+            </a:pPr>
+            <a:endParaRPr lang="en-US" sz="2400" dirty="0" smtClean="0"/>
+          </a:p>
+          <a:p>
+            <a:pPr marL="342900" indent="-342900">
+              <a:buFont typeface="Arial" panose="020B0604020202020204" pitchFamily="34" charset="0"/>
+              <a:buChar char="•"/>
+            </a:pPr>
+            <a:endParaRPr lang="en-US" sz="2400" dirty="0" smtClean="0"/>
+          </a:p>
+          <a:p>
+            <a:pPr marL="342900" indent="-342900">
+              <a:buFont typeface="Arial" panose="020B0604020202020204" pitchFamily="34" charset="0"/>
+              <a:buChar char="•"/>
+            </a:pPr>
+            <a:r>
+              <a:rPr lang="en-US" sz="2400" dirty="0" smtClean="0"/>
+              <a:t>Squared and prepped stock for CNC</a:t>
+            </a:r>
+          </a:p>
+          <a:p>
+            <a:pPr marL="342900" indent="-342900">
+              <a:buFont typeface="Arial" panose="020B0604020202020204" pitchFamily="34" charset="0"/>
+              <a:buChar char="•"/>
+            </a:pPr>
+            <a:r>
+              <a:rPr lang="en-US" sz="2400" dirty="0" smtClean="0"/>
+              <a:t>Drilled holes</a:t>
+            </a:r>
+          </a:p>
+          <a:p>
+            <a:pPr marL="342900" indent="-342900">
+              <a:buFont typeface="Arial" panose="020B0604020202020204" pitchFamily="34" charset="0"/>
+              <a:buChar char="•"/>
+            </a:pPr>
+            <a:endParaRPr lang="en-US" sz="2400" dirty="0" smtClean="0"/>
+          </a:p>
+          <a:p>
+            <a:endParaRPr lang="en-US" sz="2400" dirty="0" smtClean="0"/>
+          </a:p>
+          <a:p>
+            <a:pPr marL="342900" indent="-342900">
+              <a:buFont typeface="Arial" panose="020B0604020202020204" pitchFamily="34" charset="0"/>
+              <a:buChar char="•"/>
+            </a:pPr>
+            <a:r>
+              <a:rPr lang="en-US" sz="2400" dirty="0" err="1" smtClean="0"/>
+              <a:t>Toolpaths</a:t>
+            </a:r>
+            <a:r>
+              <a:rPr lang="en-US" sz="2400" dirty="0" smtClean="0"/>
+              <a:t> created in </a:t>
+            </a:r>
+            <a:r>
+              <a:rPr lang="en-US" sz="2400" dirty="0" err="1"/>
+              <a:t>M</a:t>
+            </a:r>
+            <a:r>
+              <a:rPr lang="en-US" sz="2400" dirty="0" err="1" smtClean="0"/>
+              <a:t>astercam</a:t>
+            </a:r>
+            <a:endParaRPr lang="en-US" sz="2400" dirty="0" smtClean="0"/>
+          </a:p>
+          <a:p>
+            <a:pPr marL="342900" indent="-342900">
+              <a:buFont typeface="Arial" panose="020B0604020202020204" pitchFamily="34" charset="0"/>
+              <a:buChar char="•"/>
+            </a:pPr>
+            <a:r>
+              <a:rPr lang="en-US" sz="2400" dirty="0" smtClean="0"/>
+              <a:t>Bottom plate will be created to allow CNC of outer profile</a:t>
+            </a:r>
+            <a:endParaRPr lang="en-US" sz="2400" dirty="0"/>
+          </a:p>
+          <a:p>
+            <a:pPr marL="342900" indent="-342900">
+              <a:buFont typeface="Arial" panose="020B0604020202020204" pitchFamily="34" charset="0"/>
+              <a:buChar char="•"/>
+            </a:pPr>
+            <a:endParaRPr lang="en-US" sz="2400" dirty="0" smtClean="0"/>
+          </a:p>
+          <a:p>
+            <a:pPr marL="342900" indent="-342900">
+              <a:buFont typeface="Arial" panose="020B0604020202020204" pitchFamily="34" charset="0"/>
+              <a:buChar char="•"/>
+            </a:pPr>
+            <a:endParaRPr lang="en-US" sz="2400" dirty="0"/>
+          </a:p>
+          <a:p>
+            <a:pPr marL="342900" indent="-342900">
+              <a:buFont typeface="Arial" panose="020B0604020202020204" pitchFamily="34" charset="0"/>
+              <a:buChar char="•"/>
+            </a:pPr>
+            <a:endParaRPr lang="en-US" sz="2400" dirty="0" smtClean="0"/>
+          </a:p>
+          <a:p>
+            <a:pPr marL="342900" indent="-342900">
+              <a:buFont typeface="Arial" panose="020B0604020202020204" pitchFamily="34" charset="0"/>
+              <a:buChar char="•"/>
+            </a:pPr>
+            <a:endParaRPr lang="en-US" sz="2400" dirty="0"/>
+          </a:p>
+          <a:p>
+            <a:pPr marL="342900" indent="-342900">
+              <a:buFont typeface="Arial" panose="020B0604020202020204" pitchFamily="34" charset="0"/>
+              <a:buChar char="•"/>
+            </a:pPr>
             <a:endParaRPr lang="en-US" sz="2400" dirty="0"/>
           </a:p>
         </p:txBody>
@@ -2297,7 +2442,7 @@
       </p:sp>
       <p:sp>
         <p:nvSpPr>
-          <p:cNvPr id="9" name="Title 1"/>
+          <p:cNvPr id="10" name="Title 1"/>
           <p:cNvSpPr txBox="1">
             <a:spLocks/>
           </p:cNvSpPr>
@@ -2305,7 +2450,7 @@
         </p:nvSpPr>
         <p:spPr>
           <a:xfrm>
-            <a:off x="-695155" y="3505200"/>
+            <a:off x="-433093" y="2882683"/>
             <a:ext cx="5486400" cy="914400"/>
           </a:xfrm>
           <a:prstGeom prst="rect">
@@ -2404,8 +2549,124 @@
           <a:p>
             <a:pPr algn="ctr"/>
             <a:r>
+              <a:rPr lang="en-US" dirty="0" err="1" smtClean="0"/>
+              <a:t>Crossmembers</a:t>
+            </a:r>
+            <a:endParaRPr lang="en-US" dirty="0"/>
+          </a:p>
+        </p:txBody>
+      </p:sp>
+      <p:sp>
+        <p:nvSpPr>
+          <p:cNvPr id="11" name="Title 1"/>
+          <p:cNvSpPr txBox="1">
+            <a:spLocks/>
+          </p:cNvSpPr>
+          <p:nvPr/>
+        </p:nvSpPr>
+        <p:spPr>
+          <a:xfrm>
+            <a:off x="-522617" y="4457700"/>
+            <a:ext cx="5486400" cy="914400"/>
+          </a:xfrm>
+          <a:prstGeom prst="rect">
+            <a:avLst/>
+          </a:prstGeom>
+        </p:spPr>
+        <p:txBody>
+          <a:bodyPr lIns="91425" tIns="91425" rIns="91425" bIns="91425" anchor="t" anchorCtr="0"/>
+          <a:lstStyle>
+            <a:defPPr marR="0" algn="l" rtl="0">
+              <a:lnSpc>
+                <a:spcPct val="100000"/>
+              </a:lnSpc>
+              <a:spcBef>
+                <a:spcPts val="0"/>
+              </a:spcBef>
+              <a:spcAft>
+                <a:spcPts val="0"/>
+              </a:spcAft>
+            </a:defPPr>
+            <a:lvl1pPr marR="0" algn="l" rtl="0">
+              <a:lnSpc>
+                <a:spcPct val="100000"/>
+              </a:lnSpc>
+              <a:spcBef>
+                <a:spcPts val="0"/>
+              </a:spcBef>
+              <a:spcAft>
+                <a:spcPts val="0"/>
+              </a:spcAft>
+              <a:buSzPct val="99224"/>
+              <a:buNone/>
+              <a:defRPr sz="4266" b="0" i="0" u="none" strike="noStrike" cap="none" baseline="0">
+                <a:solidFill>
+                  <a:srgbClr val="000000"/>
+                </a:solidFill>
+                <a:latin typeface="Arial"/>
+                <a:ea typeface="Arial"/>
+                <a:cs typeface="Arial"/>
+                <a:sym typeface="Arial"/>
+                <a:rtl val="0"/>
+              </a:defRPr>
+            </a:lvl1pPr>
+            <a:lvl2pPr marR="0" algn="l" rtl="0">
+              <a:lnSpc>
+                <a:spcPct val="100000"/>
+              </a:lnSpc>
+              <a:spcBef>
+                <a:spcPts val="0"/>
+              </a:spcBef>
+              <a:spcAft>
+                <a:spcPts val="0"/>
+              </a:spcAft>
+              <a:buSzPct val="99224"/>
+              <a:buNone/>
+              <a:defRPr sz="4266" b="0" i="0" u="none" strike="noStrike" cap="none" baseline="0">
+                <a:solidFill>
+                  <a:srgbClr val="000000"/>
+                </a:solidFill>
+                <a:latin typeface="Arial"/>
+                <a:ea typeface="Arial"/>
+                <a:cs typeface="Arial"/>
+                <a:sym typeface="Arial"/>
+                <a:rtl val="0"/>
+              </a:defRPr>
+            </a:lvl2pPr>
+            <a:lvl3pPr>
+              <a:buSzPct val="99224"/>
+              <a:defRPr sz="4266"/>
+            </a:lvl3pPr>
+            <a:lvl4pPr>
+              <a:buSzPct val="99224"/>
+              <a:defRPr sz="4266"/>
+            </a:lvl4pPr>
+            <a:lvl5pPr>
+              <a:buSzPct val="99224"/>
+              <a:defRPr sz="4266"/>
+            </a:lvl5pPr>
+            <a:lvl6pPr>
+              <a:buSzPct val="99224"/>
+              <a:defRPr sz="4266"/>
+            </a:lvl6pPr>
+            <a:lvl7pPr>
+              <a:buSzPct val="99224"/>
+              <a:defRPr sz="4266"/>
+            </a:lvl7pPr>
+            <a:lvl8pPr>
+              <a:buSzPct val="99224"/>
+              <a:defRPr sz="4266"/>
+            </a:lvl8pPr>
+            <a:lvl9pPr>
+              <a:buSzPct val="99224"/>
+              <a:defRPr sz="4266"/>
+            </a:lvl9pPr>
+          </a:lstStyle>
+          <a:p>
+            <a:pPr algn="ctr"/>
+            <a:r>
               <a:rPr lang="en-US" dirty="0" smtClean="0"/>
-              <a:t>Battery Clips</a:t>
+              <a:t>Camera Mount</a:t>
             </a:r>
             <a:endParaRPr lang="en-US" dirty="0"/>
           </a:p>
@@ -2425,6 +2686,428 @@
 </file>
 
 <file path=ppt/slides/slide3.xml><?xml version="1.0" encoding="utf-8"?>
+<p:sld xmlns:a="http://schemas.openxmlformats.org/drawingml/2006/main" xmlns:r="http://schemas.openxmlformats.org/officeDocument/2006/relationships" xmlns:p="http://schemas.openxmlformats.org/presentationml/2006/main">
+  <p:cSld>
+    <p:spTree>
+      <p:nvGrpSpPr>
+        <p:cNvPr id="1" name=""/>
+        <p:cNvGrpSpPr/>
+        <p:nvPr/>
+      </p:nvGrpSpPr>
+      <p:grpSpPr>
+        <a:xfrm>
+          <a:off x="0" y="0"/>
+          <a:ext cx="0" cy="0"/>
+          <a:chOff x="0" y="0"/>
+          <a:chExt cx="0" cy="0"/>
+        </a:xfrm>
+      </p:grpSpPr>
+      <p:sp>
+        <p:nvSpPr>
+          <p:cNvPr id="3" name="Text Placeholder 2"/>
+          <p:cNvSpPr>
+            <a:spLocks noGrp="1"/>
+          </p:cNvSpPr>
+          <p:nvPr>
+            <p:ph type="body" idx="1"/>
+          </p:nvPr>
+        </p:nvSpPr>
+        <p:spPr/>
+        <p:txBody>
+          <a:bodyPr/>
+          <a:lstStyle/>
+          <a:p>
+            <a:r>
+              <a:rPr lang="en-US" dirty="0" smtClean="0"/>
+              <a:t> </a:t>
+            </a:r>
+            <a:endParaRPr lang="en-US" dirty="0"/>
+          </a:p>
+        </p:txBody>
+      </p:sp>
+      <p:sp>
+        <p:nvSpPr>
+          <p:cNvPr id="4" name="Text Placeholder 3"/>
+          <p:cNvSpPr>
+            <a:spLocks noGrp="1"/>
+          </p:cNvSpPr>
+          <p:nvPr>
+            <p:ph type="body" idx="2"/>
+          </p:nvPr>
+        </p:nvSpPr>
+        <p:spPr>
+          <a:xfrm>
+            <a:off x="3751068" y="2069968"/>
+            <a:ext cx="6408931" cy="5486399"/>
+          </a:xfrm>
+        </p:spPr>
+        <p:txBody>
+          <a:bodyPr/>
+          <a:lstStyle/>
+          <a:p>
+            <a:pPr marL="342900" indent="-342900">
+              <a:buFont typeface="Arial" panose="020B0604020202020204" pitchFamily="34" charset="0"/>
+              <a:buChar char="•"/>
+            </a:pPr>
+            <a:r>
+              <a:rPr lang="en-US" sz="2800" dirty="0"/>
+              <a:t>Hold battery to bottom cross member</a:t>
+            </a:r>
+          </a:p>
+          <a:p>
+            <a:pPr marL="342900" indent="-342900">
+              <a:buFont typeface="Arial" panose="020B0604020202020204" pitchFamily="34" charset="0"/>
+              <a:buChar char="•"/>
+            </a:pPr>
+            <a:r>
+              <a:rPr lang="en-US" sz="2800" dirty="0"/>
+              <a:t>Set screws hold battery clip in place</a:t>
+            </a:r>
+          </a:p>
+          <a:p>
+            <a:pPr marL="342900" indent="-342900">
+              <a:buFont typeface="Arial" panose="020B0604020202020204" pitchFamily="34" charset="0"/>
+              <a:buChar char="•"/>
+            </a:pPr>
+            <a:r>
+              <a:rPr lang="en-US" sz="2800" dirty="0"/>
+              <a:t>Must be movable to accommodate extra </a:t>
+            </a:r>
+            <a:r>
+              <a:rPr lang="en-US" sz="2800" dirty="0" smtClean="0"/>
+              <a:t>batteries</a:t>
+            </a:r>
+          </a:p>
+          <a:p>
+            <a:pPr marL="342900" indent="-342900">
+              <a:buFont typeface="Arial" panose="020B0604020202020204" pitchFamily="34" charset="0"/>
+              <a:buChar char="•"/>
+            </a:pPr>
+            <a:endParaRPr lang="en-US" sz="2800" dirty="0"/>
+          </a:p>
+          <a:p>
+            <a:pPr marL="342900" indent="-342900">
+              <a:buFont typeface="Arial" panose="020B0604020202020204" pitchFamily="34" charset="0"/>
+              <a:buChar char="•"/>
+            </a:pPr>
+            <a:r>
+              <a:rPr lang="en-US" sz="2800" dirty="0" smtClean="0"/>
+              <a:t>Velcro straps will be used to tightly hold battery in place</a:t>
+            </a:r>
+          </a:p>
+          <a:p>
+            <a:pPr marL="342900" indent="-342900">
+              <a:buFont typeface="Arial" panose="020B0604020202020204" pitchFamily="34" charset="0"/>
+              <a:buChar char="•"/>
+            </a:pPr>
+            <a:endParaRPr lang="en-US" sz="2800" dirty="0"/>
+          </a:p>
+          <a:p>
+            <a:endParaRPr lang="en-US" dirty="0" smtClean="0"/>
+          </a:p>
+        </p:txBody>
+      </p:sp>
+      <p:sp>
+        <p:nvSpPr>
+          <p:cNvPr id="5" name="Shape 154"/>
+          <p:cNvSpPr/>
+          <p:nvPr/>
+        </p:nvSpPr>
+        <p:spPr>
+          <a:xfrm>
+            <a:off x="-17275" y="6807200"/>
+            <a:ext cx="10177274" cy="846650"/>
+          </a:xfrm>
+          <a:prstGeom prst="rect">
+            <a:avLst/>
+          </a:prstGeom>
+          <a:blipFill>
+            <a:blip r:embed="rId3"/>
+            <a:stretch>
+              <a:fillRect/>
+            </a:stretch>
+          </a:blipFill>
+        </p:spPr>
+      </p:sp>
+      <p:sp>
+        <p:nvSpPr>
+          <p:cNvPr id="7" name="Shape 152"/>
+          <p:cNvSpPr txBox="1">
+            <a:spLocks/>
+          </p:cNvSpPr>
+          <p:nvPr/>
+        </p:nvSpPr>
+        <p:spPr>
+          <a:xfrm>
+            <a:off x="304800" y="304800"/>
+            <a:ext cx="9626699" cy="990599"/>
+          </a:xfrm>
+          <a:prstGeom prst="rect">
+            <a:avLst/>
+          </a:prstGeom>
+        </p:spPr>
+        <p:txBody>
+          <a:bodyPr lIns="38100" tIns="38100" rIns="38100" bIns="38100" anchor="t" anchorCtr="0">
+            <a:noAutofit/>
+          </a:bodyPr>
+          <a:lstStyle>
+            <a:defPPr marR="0" algn="l" rtl="0">
+              <a:lnSpc>
+                <a:spcPct val="100000"/>
+              </a:lnSpc>
+              <a:spcBef>
+                <a:spcPts val="0"/>
+              </a:spcBef>
+              <a:spcAft>
+                <a:spcPts val="0"/>
+              </a:spcAft>
+            </a:defPPr>
+            <a:lvl1pPr marR="0" algn="l" rtl="0">
+              <a:lnSpc>
+                <a:spcPct val="100000"/>
+              </a:lnSpc>
+              <a:spcBef>
+                <a:spcPts val="0"/>
+              </a:spcBef>
+              <a:spcAft>
+                <a:spcPts val="0"/>
+              </a:spcAft>
+              <a:buSzPct val="99224"/>
+              <a:buNone/>
+              <a:defRPr sz="4266" b="0" i="0" u="none" strike="noStrike" cap="none" baseline="0">
+                <a:solidFill>
+                  <a:srgbClr val="000000"/>
+                </a:solidFill>
+                <a:latin typeface="Arial"/>
+                <a:ea typeface="Arial"/>
+                <a:cs typeface="Arial"/>
+                <a:sym typeface="Arial"/>
+                <a:rtl val="0"/>
+              </a:defRPr>
+            </a:lvl1pPr>
+            <a:lvl2pPr marR="0" algn="l" rtl="0">
+              <a:lnSpc>
+                <a:spcPct val="100000"/>
+              </a:lnSpc>
+              <a:spcBef>
+                <a:spcPts val="0"/>
+              </a:spcBef>
+              <a:spcAft>
+                <a:spcPts val="0"/>
+              </a:spcAft>
+              <a:buSzPct val="99224"/>
+              <a:buNone/>
+              <a:defRPr sz="4266" b="0" i="0" u="none" strike="noStrike" cap="none" baseline="0">
+                <a:solidFill>
+                  <a:srgbClr val="000000"/>
+                </a:solidFill>
+                <a:latin typeface="Arial"/>
+                <a:ea typeface="Arial"/>
+                <a:cs typeface="Arial"/>
+                <a:sym typeface="Arial"/>
+                <a:rtl val="0"/>
+              </a:defRPr>
+            </a:lvl2pPr>
+            <a:lvl3pPr>
+              <a:buSzPct val="99224"/>
+              <a:defRPr sz="4266"/>
+            </a:lvl3pPr>
+            <a:lvl4pPr>
+              <a:buSzPct val="99224"/>
+              <a:defRPr sz="4266"/>
+            </a:lvl4pPr>
+            <a:lvl5pPr>
+              <a:buSzPct val="99224"/>
+              <a:defRPr sz="4266"/>
+            </a:lvl5pPr>
+            <a:lvl6pPr>
+              <a:buSzPct val="99224"/>
+              <a:defRPr sz="4266"/>
+            </a:lvl6pPr>
+            <a:lvl7pPr>
+              <a:buSzPct val="99224"/>
+              <a:defRPr sz="4266"/>
+            </a:lvl7pPr>
+            <a:lvl8pPr>
+              <a:buSzPct val="99224"/>
+              <a:defRPr sz="4266"/>
+            </a:lvl8pPr>
+            <a:lvl9pPr>
+              <a:buSzPct val="99224"/>
+              <a:defRPr sz="4266"/>
+            </a:lvl9pPr>
+          </a:lstStyle>
+          <a:p>
+            <a:pPr algn="ctr"/>
+            <a:r>
+              <a:rPr lang="en-US" sz="5330" b="1" dirty="0" smtClean="0"/>
+              <a:t>Chassis Upgrade</a:t>
+            </a:r>
+            <a:endParaRPr lang="en-US" sz="5330" b="1" dirty="0"/>
+          </a:p>
+        </p:txBody>
+      </p:sp>
+      <p:sp>
+        <p:nvSpPr>
+          <p:cNvPr id="9" name="Title 1"/>
+          <p:cNvSpPr txBox="1">
+            <a:spLocks noGrp="1"/>
+          </p:cNvSpPr>
+          <p:nvPr>
+            <p:ph type="title"/>
+          </p:nvPr>
+        </p:nvSpPr>
+        <p:spPr>
+          <a:xfrm>
+            <a:off x="-558800" y="1104900"/>
+            <a:ext cx="5486400" cy="914400"/>
+          </a:xfrm>
+          <a:prstGeom prst="rect">
+            <a:avLst/>
+          </a:prstGeom>
+        </p:spPr>
+        <p:txBody>
+          <a:bodyPr lIns="91425" tIns="91425" rIns="91425" bIns="91425" anchor="t" anchorCtr="0"/>
+          <a:lstStyle>
+            <a:defPPr marR="0" algn="l" rtl="0">
+              <a:lnSpc>
+                <a:spcPct val="100000"/>
+              </a:lnSpc>
+              <a:spcBef>
+                <a:spcPts val="0"/>
+              </a:spcBef>
+              <a:spcAft>
+                <a:spcPts val="0"/>
+              </a:spcAft>
+            </a:defPPr>
+            <a:lvl1pPr marR="0" algn="l" rtl="0">
+              <a:lnSpc>
+                <a:spcPct val="100000"/>
+              </a:lnSpc>
+              <a:spcBef>
+                <a:spcPts val="0"/>
+              </a:spcBef>
+              <a:spcAft>
+                <a:spcPts val="0"/>
+              </a:spcAft>
+              <a:buSzPct val="99224"/>
+              <a:buNone/>
+              <a:defRPr sz="4266" b="0" i="0" u="none" strike="noStrike" cap="none" baseline="0">
+                <a:solidFill>
+                  <a:srgbClr val="000000"/>
+                </a:solidFill>
+                <a:latin typeface="Arial"/>
+                <a:ea typeface="Arial"/>
+                <a:cs typeface="Arial"/>
+                <a:sym typeface="Arial"/>
+                <a:rtl val="0"/>
+              </a:defRPr>
+            </a:lvl1pPr>
+            <a:lvl2pPr marR="0" algn="l" rtl="0">
+              <a:lnSpc>
+                <a:spcPct val="100000"/>
+              </a:lnSpc>
+              <a:spcBef>
+                <a:spcPts val="0"/>
+              </a:spcBef>
+              <a:spcAft>
+                <a:spcPts val="0"/>
+              </a:spcAft>
+              <a:buSzPct val="99224"/>
+              <a:buNone/>
+              <a:defRPr sz="4266" b="0" i="0" u="none" strike="noStrike" cap="none" baseline="0">
+                <a:solidFill>
+                  <a:srgbClr val="000000"/>
+                </a:solidFill>
+                <a:latin typeface="Arial"/>
+                <a:ea typeface="Arial"/>
+                <a:cs typeface="Arial"/>
+                <a:sym typeface="Arial"/>
+                <a:rtl val="0"/>
+              </a:defRPr>
+            </a:lvl2pPr>
+            <a:lvl3pPr>
+              <a:buSzPct val="99224"/>
+              <a:defRPr sz="4266"/>
+            </a:lvl3pPr>
+            <a:lvl4pPr>
+              <a:buSzPct val="99224"/>
+              <a:defRPr sz="4266"/>
+            </a:lvl4pPr>
+            <a:lvl5pPr>
+              <a:buSzPct val="99224"/>
+              <a:defRPr sz="4266"/>
+            </a:lvl5pPr>
+            <a:lvl6pPr>
+              <a:buSzPct val="99224"/>
+              <a:defRPr sz="4266"/>
+            </a:lvl6pPr>
+            <a:lvl7pPr>
+              <a:buSzPct val="99224"/>
+              <a:defRPr sz="4266"/>
+            </a:lvl7pPr>
+            <a:lvl8pPr>
+              <a:buSzPct val="99224"/>
+              <a:defRPr sz="4266"/>
+            </a:lvl8pPr>
+            <a:lvl9pPr>
+              <a:buSzPct val="99224"/>
+              <a:defRPr sz="4266"/>
+            </a:lvl9pPr>
+          </a:lstStyle>
+          <a:p>
+            <a:pPr algn="ctr"/>
+            <a:r>
+              <a:rPr lang="en-US" dirty="0" smtClean="0"/>
+              <a:t>Battery Clips</a:t>
+            </a:r>
+            <a:endParaRPr lang="en-US" dirty="0"/>
+          </a:p>
+        </p:txBody>
+      </p:sp>
+      <p:pic>
+        <p:nvPicPr>
+          <p:cNvPr id="6" name="Picture 5"/>
+          <p:cNvPicPr>
+            <a:picLocks noChangeAspect="1"/>
+          </p:cNvPicPr>
+          <p:nvPr/>
+        </p:nvPicPr>
+        <p:blipFill rotWithShape="1">
+          <a:blip r:embed="rId4">
+            <a:extLst>
+              <a:ext uri="{28A0092B-C50C-407E-A947-70E740481C1C}">
+                <a14:useLocalDpi xmlns:a14="http://schemas.microsoft.com/office/drawing/2010/main" val="0"/>
+              </a:ext>
+            </a:extLst>
+          </a:blip>
+          <a:srcRect l="24456" r="29892"/>
+          <a:stretch/>
+        </p:blipFill>
+        <p:spPr>
+          <a:xfrm>
+            <a:off x="207263" y="2286000"/>
+            <a:ext cx="3319268" cy="3230194"/>
+          </a:xfrm>
+          <a:prstGeom prst="rect">
+            <a:avLst/>
+          </a:prstGeom>
+        </p:spPr>
+      </p:pic>
+    </p:spTree>
+    <p:extLst>
+      <p:ext uri="{BB962C8B-B14F-4D97-AF65-F5344CB8AC3E}">
+        <p14:creationId xmlns:p14="http://schemas.microsoft.com/office/powerpoint/2010/main" val="333839589"/>
+      </p:ext>
+    </p:extLst>
+  </p:cSld>
+  <p:clrMapOvr>
+    <a:masterClrMapping/>
+  </p:clrMapOvr>
+</p:sld>
+</file>
+
+<file path=ppt/slides/slide4.xml><?xml version="1.0" encoding="utf-8"?>
 <p:sld xmlns:a="http://schemas.openxmlformats.org/drawingml/2006/main" xmlns:r="http://schemas.openxmlformats.org/officeDocument/2006/relationships" xmlns:p="http://schemas.openxmlformats.org/presentationml/2006/main">
   <p:cSld>
     <p:spTree>
@@ -2556,8 +3239,34 @@
             </a:pPr>
             <a:r>
               <a:rPr lang="en-US" dirty="0" smtClean="0"/>
-              <a:t>Easily removable</a:t>
-            </a:r>
+              <a:t>Easily </a:t>
+            </a:r>
+            <a:r>
+              <a:rPr lang="en-US" dirty="0" smtClean="0"/>
+              <a:t>removable, preferably without removing</a:t>
+            </a:r>
+          </a:p>
+          <a:p>
+            <a:pPr marL="457200" lvl="2" indent="-457200">
+              <a:buFont typeface="Arial" panose="020B0604020202020204" pitchFamily="34" charset="0"/>
+              <a:buChar char="•"/>
+            </a:pPr>
+            <a:endParaRPr lang="en-US" dirty="0"/>
+          </a:p>
+          <a:p>
+            <a:pPr marL="457200" lvl="2" indent="-457200">
+              <a:buFont typeface="Arial" panose="020B0604020202020204" pitchFamily="34" charset="0"/>
+              <a:buChar char="•"/>
+            </a:pPr>
+            <a:r>
+              <a:rPr lang="en-US" dirty="0" smtClean="0"/>
+              <a:t>Easily </a:t>
+            </a:r>
+            <a:r>
+              <a:rPr lang="en-US" dirty="0" err="1" smtClean="0"/>
+              <a:t>Manufacturable</a:t>
+            </a:r>
+            <a:endParaRPr lang="en-US" dirty="0" smtClean="0"/>
           </a:p>
           <a:p>
             <a:pPr lvl="2"/>
@@ -2712,279 +3421,34 @@
           </a:p>
         </p:txBody>
       </p:sp>
-    </p:spTree>
-    <p:extLst>
-      <p:ext uri="{BB962C8B-B14F-4D97-AF65-F5344CB8AC3E}">
-        <p14:creationId xmlns:p14="http://schemas.microsoft.com/office/powerpoint/2010/main" val="3098883660"/>
-      </p:ext>
-    </p:extLst>
-  </p:cSld>
-  <p:clrMapOvr>
-    <a:masterClrMapping/>
-  </p:clrMapOvr>
-</p:sld>
-</file>
-
-<file path=ppt/slides/slide4.xml><?xml version="1.0" encoding="utf-8"?>
-<p:sld xmlns:a="http://schemas.openxmlformats.org/drawingml/2006/main" xmlns:r="http://schemas.openxmlformats.org/officeDocument/2006/relationships" xmlns:p="http://schemas.openxmlformats.org/presentationml/2006/main">
-  <p:cSld>
-    <p:spTree>
-      <p:nvGrpSpPr>
-        <p:cNvPr id="1" name=""/>
-        <p:cNvGrpSpPr/>
-        <p:nvPr/>
-      </p:nvGrpSpPr>
-      <p:grpSpPr>
-        <a:xfrm>
-          <a:off x="0" y="0"/>
-          <a:ext cx="0" cy="0"/>
-          <a:chOff x="0" y="0"/>
-          <a:chExt cx="0" cy="0"/>
-        </a:xfrm>
-      </p:grpSpPr>
-      <p:sp>
-        <p:nvSpPr>
-          <p:cNvPr id="2" name="Title 1"/>
-          <p:cNvSpPr>
-            <a:spLocks noGrp="1"/>
-          </p:cNvSpPr>
-          <p:nvPr>
-            <p:ph type="title"/>
-          </p:nvPr>
-        </p:nvSpPr>
+      <p:pic>
+        <p:nvPicPr>
+          <p:cNvPr id="6" name="Picture 5"/>
+          <p:cNvPicPr>
+            <a:picLocks noChangeAspect="1"/>
+          </p:cNvPicPr>
+          <p:nvPr/>
+        </p:nvPicPr>
+        <p:blipFill>
+          <a:blip r:embed="rId4"/>
+          <a:stretch>
+            <a:fillRect/>
+          </a:stretch>
+        </p:blipFill>
         <p:spPr>
           <a:xfrm>
-            <a:off x="-558800" y="1104175"/>
-            <a:ext cx="5486400" cy="914400"/>
-          </a:xfrm>
-        </p:spPr>
-        <p:txBody>
-          <a:bodyPr/>
-          <a:lstStyle/>
-          <a:p>
-            <a:pPr algn="ctr"/>
-            <a:endParaRPr lang="en-US" dirty="0"/>
-          </a:p>
-        </p:txBody>
-      </p:sp>
-      <p:sp>
-        <p:nvSpPr>
-          <p:cNvPr id="3" name="Text Placeholder 2"/>
-          <p:cNvSpPr>
-            <a:spLocks noGrp="1"/>
-          </p:cNvSpPr>
-          <p:nvPr>
-            <p:ph type="body" idx="1"/>
-          </p:nvPr>
-        </p:nvSpPr>
-        <p:spPr/>
-        <p:txBody>
-          <a:bodyPr/>
-          <a:lstStyle/>
-          <a:p>
-            <a:r>
-              <a:rPr lang="en-US" dirty="0" smtClean="0"/>
-              <a:t> </a:t>
-            </a:r>
-            <a:endParaRPr lang="en-US" dirty="0"/>
-          </a:p>
-        </p:txBody>
-      </p:sp>
-      <p:sp>
-        <p:nvSpPr>
-          <p:cNvPr id="4" name="Text Placeholder 3"/>
-          <p:cNvSpPr>
-            <a:spLocks noGrp="1"/>
-          </p:cNvSpPr>
-          <p:nvPr>
-            <p:ph type="body" idx="2"/>
-          </p:nvPr>
-        </p:nvSpPr>
-        <p:spPr>
-          <a:xfrm>
-            <a:off x="3751068" y="2069968"/>
-            <a:ext cx="6408931" cy="5486399"/>
-          </a:xfrm>
-        </p:spPr>
-        <p:txBody>
-          <a:bodyPr/>
-          <a:lstStyle/>
-          <a:p>
-            <a:endParaRPr lang="en-US" dirty="0" smtClean="0"/>
-          </a:p>
-        </p:txBody>
-      </p:sp>
-      <p:sp>
-        <p:nvSpPr>
-          <p:cNvPr id="5" name="Shape 154"/>
-          <p:cNvSpPr/>
-          <p:nvPr/>
-        </p:nvSpPr>
-        <p:spPr>
-          <a:xfrm>
-            <a:off x="-17275" y="6807200"/>
-            <a:ext cx="10177274" cy="846650"/>
-          </a:xfrm>
-          <a:prstGeom prst="rect">
-            <a:avLst/>
-          </a:prstGeom>
-          <a:blipFill>
-            <a:blip r:embed="rId3"/>
-            <a:stretch>
-              <a:fillRect/>
-            </a:stretch>
-          </a:blipFill>
-        </p:spPr>
-      </p:sp>
-      <p:sp>
-        <p:nvSpPr>
-          <p:cNvPr id="8" name="Shape 156"/>
-          <p:cNvSpPr/>
-          <p:nvPr/>
-        </p:nvSpPr>
-        <p:spPr>
-          <a:xfrm>
-            <a:off x="431801" y="2590800"/>
-            <a:ext cx="2666999" cy="3824537"/>
-          </a:xfrm>
-          <a:prstGeom prst="rect">
-            <a:avLst/>
-          </a:prstGeom>
-          <a:blipFill>
-            <a:blip r:embed="rId4"/>
-            <a:stretch>
-              <a:fillRect/>
-            </a:stretch>
-          </a:blipFill>
-          <a:ln>
-            <a:solidFill>
-              <a:schemeClr val="tx1"/>
-            </a:solidFill>
-          </a:ln>
-        </p:spPr>
-      </p:sp>
-      <p:sp>
-        <p:nvSpPr>
-          <p:cNvPr id="7" name="Shape 152"/>
-          <p:cNvSpPr txBox="1">
-            <a:spLocks/>
-          </p:cNvSpPr>
-          <p:nvPr/>
-        </p:nvSpPr>
-        <p:spPr>
-          <a:xfrm>
-            <a:off x="304800" y="304800"/>
-            <a:ext cx="9626699" cy="990599"/>
+            <a:off x="309880" y="2588049"/>
+            <a:ext cx="3540181" cy="2096777"/>
           </a:xfrm>
           <a:prstGeom prst="rect">
             <a:avLst/>
           </a:prstGeom>
         </p:spPr>
-        <p:txBody>
-          <a:bodyPr lIns="38100" tIns="38100" rIns="38100" bIns="38100" anchor="t" anchorCtr="0">
-            <a:noAutofit/>
-          </a:bodyPr>
-          <a:lstStyle>
-            <a:defPPr marR="0" algn="l" rtl="0">
-              <a:lnSpc>
-                <a:spcPct val="100000"/>
-              </a:lnSpc>
-              <a:spcBef>
-                <a:spcPts val="0"/>
-              </a:spcBef>
-              <a:spcAft>
-                <a:spcPts val="0"/>
-              </a:spcAft>
-            </a:defPPr>
-            <a:lvl1pPr marR="0" algn="l" rtl="0">
-              <a:lnSpc>
-                <a:spcPct val="100000"/>
-              </a:lnSpc>
-              <a:spcBef>
-                <a:spcPts val="0"/>
-              </a:spcBef>
-              <a:spcAft>
-                <a:spcPts val="0"/>
-              </a:spcAft>
-              <a:buSzPct val="99224"/>
-              <a:buNone/>
-              <a:defRPr sz="4266" b="0" i="0" u="none" strike="noStrike" cap="none" baseline="0">
-                <a:solidFill>
-                  <a:srgbClr val="000000"/>
-                </a:solidFill>
-                <a:latin typeface="Arial"/>
-                <a:ea typeface="Arial"/>
-                <a:cs typeface="Arial"/>
-                <a:sym typeface="Arial"/>
-                <a:rtl val="0"/>
-              </a:defRPr>
-            </a:lvl1pPr>
-            <a:lvl2pPr marR="0" algn="l" rtl="0">
-              <a:lnSpc>
-                <a:spcPct val="100000"/>
-              </a:lnSpc>
-              <a:spcBef>
-                <a:spcPts val="0"/>
-              </a:spcBef>
-              <a:spcAft>
-                <a:spcPts val="0"/>
-              </a:spcAft>
-              <a:buSzPct val="99224"/>
-              <a:buNone/>
-              <a:defRPr sz="4266" b="0" i="0" u="none" strike="noStrike" cap="none" baseline="0">
-                <a:solidFill>
-                  <a:srgbClr val="000000"/>
-                </a:solidFill>
-                <a:latin typeface="Arial"/>
-                <a:ea typeface="Arial"/>
-                <a:cs typeface="Arial"/>
-                <a:sym typeface="Arial"/>
-                <a:rtl val="0"/>
-              </a:defRPr>
-            </a:lvl2pPr>
-            <a:lvl3pPr>
-              <a:buSzPct val="99224"/>
-              <a:defRPr sz="4266"/>
-            </a:lvl3pPr>
-            <a:lvl4pPr>
-              <a:buSzPct val="99224"/>
-              <a:defRPr sz="4266"/>
-            </a:lvl4pPr>
-            <a:lvl5pPr>
-              <a:buSzPct val="99224"/>
-              <a:defRPr sz="4266"/>
-            </a:lvl5pPr>
-            <a:lvl6pPr>
-              <a:buSzPct val="99224"/>
-              <a:defRPr sz="4266"/>
-            </a:lvl6pPr>
-            <a:lvl7pPr>
-              <a:buSzPct val="99224"/>
-              <a:defRPr sz="4266"/>
-            </a:lvl7pPr>
-            <a:lvl8pPr>
-              <a:buSzPct val="99224"/>
-              <a:defRPr sz="4266"/>
-            </a:lvl8pPr>
-            <a:lvl9pPr>
-              <a:buSzPct val="99224"/>
-              <a:defRPr sz="4266"/>
-            </a:lvl9pPr>
-          </a:lstStyle>
-          <a:p>
-            <a:pPr algn="ctr"/>
-            <a:r>
-              <a:rPr lang="en-US" sz="5330" b="1" dirty="0" smtClean="0"/>
-              <a:t>Chassis Upgrade</a:t>
-            </a:r>
-            <a:endParaRPr lang="en-US" sz="5330" b="1" dirty="0"/>
-          </a:p>
-        </p:txBody>
-      </p:sp>
+      </p:pic>
     </p:spTree>
     <p:extLst>
       <p:ext uri="{BB962C8B-B14F-4D97-AF65-F5344CB8AC3E}">
-        <p14:creationId xmlns:p14="http://schemas.microsoft.com/office/powerpoint/2010/main" val="333839589"/>
+        <p14:creationId xmlns:p14="http://schemas.microsoft.com/office/powerpoint/2010/main" val="3098883660"/>
       </p:ext>
     </p:extLst>
   </p:cSld>

</xml_diff>